<commit_message>
DC Motor Circuit 수정
P2N2222A의 E와 C가 반대로 연결된 오류 수정
</commit_message>
<xml_diff>
--- a/Assets/SmartMaker/Circuits.pptx
+++ b/Assets/SmartMaker/Circuits.pptx
@@ -304,7 +304,7 @@
           <a:p>
             <a:fld id="{FB30EDBD-1C2D-4C1E-B459-B60219FAB484}" type="datetimeFigureOut">
               <a:rPr lang="ko-KR" altLang="en-US" smtClean="0"/>
-              <a:t>2015-04-02</a:t>
+              <a:t>2015-05-01</a:t>
             </a:fld>
             <a:endParaRPr lang="ko-KR" altLang="en-US"/>
           </a:p>
@@ -469,7 +469,7 @@
           <a:p>
             <a:fld id="{FB30EDBD-1C2D-4C1E-B459-B60219FAB484}" type="datetimeFigureOut">
               <a:rPr lang="ko-KR" altLang="en-US" smtClean="0"/>
-              <a:t>2015-04-02</a:t>
+              <a:t>2015-05-01</a:t>
             </a:fld>
             <a:endParaRPr lang="ko-KR" altLang="en-US"/>
           </a:p>
@@ -644,7 +644,7 @@
           <a:p>
             <a:fld id="{FB30EDBD-1C2D-4C1E-B459-B60219FAB484}" type="datetimeFigureOut">
               <a:rPr lang="ko-KR" altLang="en-US" smtClean="0"/>
-              <a:t>2015-04-02</a:t>
+              <a:t>2015-05-01</a:t>
             </a:fld>
             <a:endParaRPr lang="ko-KR" altLang="en-US"/>
           </a:p>
@@ -809,7 +809,7 @@
           <a:p>
             <a:fld id="{FB30EDBD-1C2D-4C1E-B459-B60219FAB484}" type="datetimeFigureOut">
               <a:rPr lang="ko-KR" altLang="en-US" smtClean="0"/>
-              <a:t>2015-04-02</a:t>
+              <a:t>2015-05-01</a:t>
             </a:fld>
             <a:endParaRPr lang="ko-KR" altLang="en-US"/>
           </a:p>
@@ -1050,7 +1050,7 @@
           <a:p>
             <a:fld id="{FB30EDBD-1C2D-4C1E-B459-B60219FAB484}" type="datetimeFigureOut">
               <a:rPr lang="ko-KR" altLang="en-US" smtClean="0"/>
-              <a:t>2015-04-02</a:t>
+              <a:t>2015-05-01</a:t>
             </a:fld>
             <a:endParaRPr lang="ko-KR" altLang="en-US"/>
           </a:p>
@@ -1333,7 +1333,7 @@
           <a:p>
             <a:fld id="{FB30EDBD-1C2D-4C1E-B459-B60219FAB484}" type="datetimeFigureOut">
               <a:rPr lang="ko-KR" altLang="en-US" smtClean="0"/>
-              <a:t>2015-04-02</a:t>
+              <a:t>2015-05-01</a:t>
             </a:fld>
             <a:endParaRPr lang="ko-KR" altLang="en-US"/>
           </a:p>
@@ -1750,7 +1750,7 @@
           <a:p>
             <a:fld id="{FB30EDBD-1C2D-4C1E-B459-B60219FAB484}" type="datetimeFigureOut">
               <a:rPr lang="ko-KR" altLang="en-US" smtClean="0"/>
-              <a:t>2015-04-02</a:t>
+              <a:t>2015-05-01</a:t>
             </a:fld>
             <a:endParaRPr lang="ko-KR" altLang="en-US"/>
           </a:p>
@@ -1863,7 +1863,7 @@
           <a:p>
             <a:fld id="{FB30EDBD-1C2D-4C1E-B459-B60219FAB484}" type="datetimeFigureOut">
               <a:rPr lang="ko-KR" altLang="en-US" smtClean="0"/>
-              <a:t>2015-04-02</a:t>
+              <a:t>2015-05-01</a:t>
             </a:fld>
             <a:endParaRPr lang="ko-KR" altLang="en-US"/>
           </a:p>
@@ -1953,7 +1953,7 @@
           <a:p>
             <a:fld id="{FB30EDBD-1C2D-4C1E-B459-B60219FAB484}" type="datetimeFigureOut">
               <a:rPr lang="ko-KR" altLang="en-US" smtClean="0"/>
-              <a:t>2015-04-02</a:t>
+              <a:t>2015-05-01</a:t>
             </a:fld>
             <a:endParaRPr lang="ko-KR" altLang="en-US"/>
           </a:p>
@@ -2225,7 +2225,7 @@
           <a:p>
             <a:fld id="{FB30EDBD-1C2D-4C1E-B459-B60219FAB484}" type="datetimeFigureOut">
               <a:rPr lang="ko-KR" altLang="en-US" smtClean="0"/>
-              <a:t>2015-04-02</a:t>
+              <a:t>2015-05-01</a:t>
             </a:fld>
             <a:endParaRPr lang="ko-KR" altLang="en-US"/>
           </a:p>
@@ -2473,7 +2473,7 @@
           <a:p>
             <a:fld id="{FB30EDBD-1C2D-4C1E-B459-B60219FAB484}" type="datetimeFigureOut">
               <a:rPr lang="ko-KR" altLang="en-US" smtClean="0"/>
-              <a:t>2015-04-02</a:t>
+              <a:t>2015-05-01</a:t>
             </a:fld>
             <a:endParaRPr lang="ko-KR" altLang="en-US"/>
           </a:p>
@@ -2681,7 +2681,7 @@
           <a:p>
             <a:fld id="{FB30EDBD-1C2D-4C1E-B459-B60219FAB484}" type="datetimeFigureOut">
               <a:rPr lang="ko-KR" altLang="en-US" smtClean="0"/>
-              <a:t>2015-04-02</a:t>
+              <a:t>2015-05-01</a:t>
             </a:fld>
             <a:endParaRPr lang="ko-KR" altLang="en-US"/>
           </a:p>
@@ -3634,7 +3634,6 @@
               <a:rPr lang="en-US" altLang="ko-KR" dirty="0" smtClean="0"/>
               <a:t>Pull-down type</a:t>
             </a:r>
-            <a:endParaRPr lang="en-US" altLang="ko-KR" dirty="0" smtClean="0"/>
           </a:p>
           <a:p>
             <a:pPr marL="285750" indent="-285750">
@@ -3881,11 +3880,7 @@
           <a:p>
             <a:r>
               <a:rPr lang="en-US" altLang="ko-KR" dirty="0" smtClean="0"/>
-              <a:t>Photo Resistor</a:t>
-            </a:r>
-            <a:r>
-              <a:rPr lang="en-US" altLang="ko-KR" dirty="0" smtClean="0"/>
-              <a:t> Circuit</a:t>
+              <a:t>Photo Resistor Circuit</a:t>
             </a:r>
             <a:endParaRPr lang="ko-KR" altLang="en-US" dirty="0"/>
           </a:p>
@@ -4512,11 +4507,7 @@
           <a:p>
             <a:r>
               <a:rPr lang="en-US" altLang="ko-KR" dirty="0" smtClean="0"/>
-              <a:t>Flex Sensor</a:t>
-            </a:r>
-            <a:r>
-              <a:rPr lang="en-US" altLang="ko-KR" dirty="0" smtClean="0"/>
-              <a:t> Circuit</a:t>
+              <a:t>Flex Sensor Circuit</a:t>
             </a:r>
             <a:endParaRPr lang="ko-KR" altLang="en-US" dirty="0"/>
           </a:p>
@@ -5208,11 +5199,7 @@
           <a:p>
             <a:r>
               <a:rPr lang="en-US" altLang="ko-KR" dirty="0" smtClean="0"/>
-              <a:t>Temperature</a:t>
-            </a:r>
-            <a:r>
-              <a:rPr lang="en-US" altLang="ko-KR" dirty="0" smtClean="0"/>
-              <a:t> Circuit</a:t>
+              <a:t>Temperature Circuit</a:t>
             </a:r>
             <a:endParaRPr lang="ko-KR" altLang="en-US" dirty="0"/>
           </a:p>
@@ -5681,11 +5668,7 @@
           <a:p>
             <a:r>
               <a:rPr lang="en-US" altLang="ko-KR" dirty="0" smtClean="0"/>
-              <a:t>Servo Motor</a:t>
-            </a:r>
-            <a:r>
-              <a:rPr lang="en-US" altLang="ko-KR" dirty="0" smtClean="0"/>
-              <a:t> Circuit</a:t>
+              <a:t>Servo Motor Circuit</a:t>
             </a:r>
             <a:endParaRPr lang="ko-KR" altLang="en-US" dirty="0"/>
           </a:p>
@@ -6164,11 +6147,7 @@
           <a:p>
             <a:r>
               <a:rPr lang="en-US" altLang="ko-KR" dirty="0" smtClean="0"/>
-              <a:t>DC Motor</a:t>
-            </a:r>
-            <a:r>
-              <a:rPr lang="en-US" altLang="ko-KR" dirty="0" smtClean="0"/>
-              <a:t> Circuit</a:t>
+              <a:t>DC Motor Circuit</a:t>
             </a:r>
             <a:endParaRPr lang="ko-KR" altLang="en-US" dirty="0"/>
           </a:p>
@@ -6640,47 +6619,6 @@
       </p:pic>
       <p:pic>
         <p:nvPicPr>
-          <p:cNvPr id="17" name="Picture 14" descr="http://www.reuk.co.uk/OtherImages/labelled-transistor.jpg"/>
-          <p:cNvPicPr>
-            <a:picLocks noChangeAspect="1" noChangeArrowheads="1"/>
-          </p:cNvPicPr>
-          <p:nvPr/>
-        </p:nvPicPr>
-        <p:blipFill>
-          <a:blip r:embed="rId4" cstate="print">
-            <a:extLst>
-              <a:ext uri="{28A0092B-C50C-407E-A947-70E740481C1C}">
-                <a14:useLocalDpi xmlns:a14="http://schemas.microsoft.com/office/drawing/2010/main" val="0"/>
-              </a:ext>
-            </a:extLst>
-          </a:blip>
-          <a:srcRect/>
-          <a:stretch>
-            <a:fillRect/>
-          </a:stretch>
-        </p:blipFill>
-        <p:spPr bwMode="auto">
-          <a:xfrm rot="2178013">
-            <a:off x="5834124" y="4037108"/>
-            <a:ext cx="1459283" cy="1258497"/>
-          </a:xfrm>
-          <a:prstGeom prst="rect">
-            <a:avLst/>
-          </a:prstGeom>
-          <a:noFill/>
-          <a:extLst>
-            <a:ext uri="{909E8E84-426E-40DD-AFC4-6F175D3DCCD1}">
-              <a14:hiddenFill xmlns:a14="http://schemas.microsoft.com/office/drawing/2010/main">
-                <a:solidFill>
-                  <a:srgbClr val="FFFFFF"/>
-                </a:solidFill>
-              </a14:hiddenFill>
-            </a:ext>
-          </a:extLst>
-        </p:spPr>
-      </p:pic>
-      <p:pic>
-        <p:nvPicPr>
           <p:cNvPr id="18" name="Picture 6"/>
           <p:cNvPicPr>
             <a:picLocks noChangeAspect="1" noChangeArrowheads="1"/>
@@ -6688,11 +6626,11 @@
           <p:nvPr/>
         </p:nvPicPr>
         <p:blipFill rotWithShape="1">
-          <a:blip r:embed="rId5">
+          <a:blip r:embed="rId4">
             <a:extLst>
               <a:ext uri="{BEBA8EAE-BF5A-486C-A8C5-ECC9F3942E4B}">
                 <a14:imgProps xmlns:a14="http://schemas.microsoft.com/office/drawing/2010/main">
-                  <a14:imgLayer r:embed="rId6">
+                  <a14:imgLayer r:embed="rId5">
                     <a14:imgEffect>
                       <a14:backgroundRemoval t="6757" b="100000" l="0" r="100000"/>
                     </a14:imgEffect>
@@ -6759,11 +6697,11 @@
           <p:nvPr/>
         </p:nvPicPr>
         <p:blipFill>
-          <a:blip r:embed="rId7" cstate="print">
+          <a:blip r:embed="rId6" cstate="print">
             <a:extLst>
               <a:ext uri="{BEBA8EAE-BF5A-486C-A8C5-ECC9F3942E4B}">
                 <a14:imgProps xmlns:a14="http://schemas.microsoft.com/office/drawing/2010/main">
-                  <a14:imgLayer r:embed="rId8">
+                  <a14:imgLayer r:embed="rId7">
                     <a14:imgEffect>
                       <a14:backgroundRemoval t="8696" b="81988" l="0" r="100000"/>
                     </a14:imgEffect>
@@ -7037,7 +6975,6 @@
               <a:rPr lang="en-US" altLang="ko-KR" dirty="0" smtClean="0"/>
               <a:t>No Direction Control</a:t>
             </a:r>
-            <a:endParaRPr lang="en-US" altLang="ko-KR" dirty="0" smtClean="0"/>
           </a:p>
           <a:p>
             <a:pPr marL="285750" indent="-285750">
@@ -7049,6 +6986,163 @@
               <a:t>Only Speed Control</a:t>
             </a:r>
             <a:endParaRPr lang="ko-KR" altLang="en-US" dirty="0"/>
+          </a:p>
+        </p:txBody>
+      </p:sp>
+      <p:pic>
+        <p:nvPicPr>
+          <p:cNvPr id="1026" name="Picture 2"/>
+          <p:cNvPicPr>
+            <a:picLocks noChangeAspect="1" noChangeArrowheads="1"/>
+          </p:cNvPicPr>
+          <p:nvPr/>
+        </p:nvPicPr>
+        <p:blipFill>
+          <a:blip r:embed="rId8">
+            <a:extLst>
+              <a:ext uri="{28A0092B-C50C-407E-A947-70E740481C1C}">
+                <a14:useLocalDpi xmlns:a14="http://schemas.microsoft.com/office/drawing/2010/main" val="0"/>
+              </a:ext>
+            </a:extLst>
+          </a:blip>
+          <a:srcRect/>
+          <a:stretch>
+            <a:fillRect/>
+          </a:stretch>
+        </p:blipFill>
+        <p:spPr bwMode="auto">
+          <a:xfrm>
+            <a:off x="6321968" y="4152106"/>
+            <a:ext cx="2276475" cy="1581150"/>
+          </a:xfrm>
+          <a:prstGeom prst="rect">
+            <a:avLst/>
+          </a:prstGeom>
+          <a:noFill/>
+          <a:ln>
+            <a:noFill/>
+          </a:ln>
+          <a:effectLst/>
+          <a:extLst>
+            <a:ext uri="{909E8E84-426E-40DD-AFC4-6F175D3DCCD1}">
+              <a14:hiddenFill xmlns:a14="http://schemas.microsoft.com/office/drawing/2010/main">
+                <a:solidFill>
+                  <a:schemeClr val="accent1"/>
+                </a:solidFill>
+              </a14:hiddenFill>
+            </a:ext>
+            <a:ext uri="{91240B29-F687-4F45-9708-019B960494DF}">
+              <a14:hiddenLine xmlns:a14="http://schemas.microsoft.com/office/drawing/2010/main" w="9525">
+                <a:solidFill>
+                  <a:schemeClr val="tx1"/>
+                </a:solidFill>
+                <a:miter lim="800000"/>
+                <a:headEnd/>
+                <a:tailEnd/>
+              </a14:hiddenLine>
+            </a:ext>
+            <a:ext uri="{AF507438-7753-43E0-B8FC-AC1667EBCBE1}">
+              <a14:hiddenEffects xmlns:a14="http://schemas.microsoft.com/office/drawing/2010/main">
+                <a:effectLst>
+                  <a:outerShdw dist="35921" dir="2700000" algn="ctr" rotWithShape="0">
+                    <a:schemeClr val="bg2"/>
+                  </a:outerShdw>
+                </a:effectLst>
+              </a14:hiddenEffects>
+            </a:ext>
+          </a:extLst>
+        </p:spPr>
+      </p:pic>
+      <p:sp>
+        <p:nvSpPr>
+          <p:cNvPr id="29" name="TextBox 28"/>
+          <p:cNvSpPr txBox="1"/>
+          <p:nvPr/>
+        </p:nvSpPr>
+        <p:spPr>
+          <a:xfrm>
+            <a:off x="5639831" y="4271662"/>
+            <a:ext cx="395148" cy="276999"/>
+          </a:xfrm>
+          <a:prstGeom prst="rect">
+            <a:avLst/>
+          </a:prstGeom>
+          <a:noFill/>
+        </p:spPr>
+        <p:txBody>
+          <a:bodyPr wrap="square" rtlCol="0">
+            <a:spAutoFit/>
+          </a:bodyPr>
+          <a:lstStyle/>
+          <a:p>
+            <a:pPr algn="ctr"/>
+            <a:r>
+              <a:rPr lang="en-US" altLang="ko-KR" sz="1200" b="1" dirty="0" smtClean="0"/>
+              <a:t>C</a:t>
+            </a:r>
+            <a:endParaRPr lang="ko-KR" altLang="en-US" sz="1200" b="1" dirty="0"/>
+          </a:p>
+        </p:txBody>
+      </p:sp>
+      <p:sp>
+        <p:nvSpPr>
+          <p:cNvPr id="30" name="TextBox 29"/>
+          <p:cNvSpPr txBox="1"/>
+          <p:nvPr/>
+        </p:nvSpPr>
+        <p:spPr>
+          <a:xfrm>
+            <a:off x="5639831" y="4834669"/>
+            <a:ext cx="395148" cy="276999"/>
+          </a:xfrm>
+          <a:prstGeom prst="rect">
+            <a:avLst/>
+          </a:prstGeom>
+          <a:noFill/>
+        </p:spPr>
+        <p:txBody>
+          <a:bodyPr wrap="square" rtlCol="0">
+            <a:spAutoFit/>
+          </a:bodyPr>
+          <a:lstStyle/>
+          <a:p>
+            <a:pPr algn="ctr"/>
+            <a:r>
+              <a:rPr lang="en-US" altLang="ko-KR" sz="1200" b="1" dirty="0" smtClean="0"/>
+              <a:t>E</a:t>
+            </a:r>
+            <a:endParaRPr lang="ko-KR" altLang="en-US" sz="1200" b="1" dirty="0"/>
+          </a:p>
+        </p:txBody>
+      </p:sp>
+      <p:sp>
+        <p:nvSpPr>
+          <p:cNvPr id="34" name="TextBox 33"/>
+          <p:cNvSpPr txBox="1"/>
+          <p:nvPr/>
+        </p:nvSpPr>
+        <p:spPr>
+          <a:xfrm>
+            <a:off x="5639831" y="4548661"/>
+            <a:ext cx="395148" cy="276999"/>
+          </a:xfrm>
+          <a:prstGeom prst="rect">
+            <a:avLst/>
+          </a:prstGeom>
+          <a:noFill/>
+        </p:spPr>
+        <p:txBody>
+          <a:bodyPr wrap="square" rtlCol="0">
+            <a:spAutoFit/>
+          </a:bodyPr>
+          <a:lstStyle/>
+          <a:p>
+            <a:pPr algn="ctr"/>
+            <a:r>
+              <a:rPr lang="en-US" altLang="ko-KR" sz="1200" b="1" dirty="0" smtClean="0"/>
+              <a:t>B</a:t>
+            </a:r>
+            <a:endParaRPr lang="ko-KR" altLang="en-US" sz="1200" b="1" dirty="0"/>
           </a:p>
         </p:txBody>
       </p:sp>
@@ -7099,15 +7193,7 @@
           <a:p>
             <a:r>
               <a:rPr lang="en-US" altLang="ko-KR" dirty="0" smtClean="0"/>
-              <a:t>Buzzer</a:t>
-            </a:r>
-            <a:r>
-              <a:rPr lang="en-US" altLang="ko-KR" dirty="0" smtClean="0"/>
-              <a:t> </a:t>
-            </a:r>
-            <a:r>
-              <a:rPr lang="en-US" altLang="ko-KR" dirty="0" smtClean="0"/>
-              <a:t>Circuit</a:t>
+              <a:t>Buzzer Circuit</a:t>
             </a:r>
             <a:endParaRPr lang="ko-KR" altLang="en-US" dirty="0"/>
           </a:p>
@@ -10830,11 +10916,7 @@
               <a:pPr algn="ctr"/>
               <a:r>
                 <a:rPr lang="en-US" altLang="ko-KR" sz="1200" b="1" dirty="0" smtClean="0"/>
-                <a:t>Servo</a:t>
-              </a:r>
-              <a:r>
-                <a:rPr lang="en-US" altLang="ko-KR" sz="1200" b="1" dirty="0" smtClean="0"/>
-                <a:t> Motor</a:t>
+                <a:t>Servo Motor</a:t>
               </a:r>
               <a:endParaRPr lang="ko-KR" altLang="en-US" sz="1200" b="1" dirty="0"/>
             </a:p>
@@ -13509,11 +13591,7 @@
             </a:pPr>
             <a:r>
               <a:rPr lang="en-US" altLang="ko-KR" dirty="0" smtClean="0"/>
-              <a:t>Internal</a:t>
-            </a:r>
-            <a:r>
-              <a:rPr lang="en-US" altLang="ko-KR" dirty="0" smtClean="0"/>
-              <a:t> Pull-up type</a:t>
+              <a:t>Internal Pull-up type</a:t>
             </a:r>
           </a:p>
           <a:p>
@@ -15204,7 +15282,6 @@
               <a:rPr lang="en-US" altLang="ko-KR" dirty="0" smtClean="0"/>
               <a:t>Pull-up type</a:t>
             </a:r>
-            <a:endParaRPr lang="en-US" altLang="ko-KR" dirty="0" smtClean="0"/>
           </a:p>
           <a:p>
             <a:pPr marL="285750" indent="-285750">

</xml_diff>

<commit_message>
Color LED 회로 수정
저항 추가
</commit_message>
<xml_diff>
--- a/Assets/SmartMaker/Circuits.pptx
+++ b/Assets/SmartMaker/Circuits.pptx
@@ -306,7 +306,7 @@
           <a:p>
             <a:fld id="{FB30EDBD-1C2D-4C1E-B459-B60219FAB484}" type="datetimeFigureOut">
               <a:rPr lang="ko-KR" altLang="en-US" smtClean="0"/>
-              <a:t>2015-05-29</a:t>
+              <a:t>2015-08-10</a:t>
             </a:fld>
             <a:endParaRPr lang="ko-KR" altLang="en-US"/>
           </a:p>
@@ -471,7 +471,7 @@
           <a:p>
             <a:fld id="{FB30EDBD-1C2D-4C1E-B459-B60219FAB484}" type="datetimeFigureOut">
               <a:rPr lang="ko-KR" altLang="en-US" smtClean="0"/>
-              <a:t>2015-05-29</a:t>
+              <a:t>2015-08-10</a:t>
             </a:fld>
             <a:endParaRPr lang="ko-KR" altLang="en-US"/>
           </a:p>
@@ -646,7 +646,7 @@
           <a:p>
             <a:fld id="{FB30EDBD-1C2D-4C1E-B459-B60219FAB484}" type="datetimeFigureOut">
               <a:rPr lang="ko-KR" altLang="en-US" smtClean="0"/>
-              <a:t>2015-05-29</a:t>
+              <a:t>2015-08-10</a:t>
             </a:fld>
             <a:endParaRPr lang="ko-KR" altLang="en-US"/>
           </a:p>
@@ -811,7 +811,7 @@
           <a:p>
             <a:fld id="{FB30EDBD-1C2D-4C1E-B459-B60219FAB484}" type="datetimeFigureOut">
               <a:rPr lang="ko-KR" altLang="en-US" smtClean="0"/>
-              <a:t>2015-05-29</a:t>
+              <a:t>2015-08-10</a:t>
             </a:fld>
             <a:endParaRPr lang="ko-KR" altLang="en-US"/>
           </a:p>
@@ -1052,7 +1052,7 @@
           <a:p>
             <a:fld id="{FB30EDBD-1C2D-4C1E-B459-B60219FAB484}" type="datetimeFigureOut">
               <a:rPr lang="ko-KR" altLang="en-US" smtClean="0"/>
-              <a:t>2015-05-29</a:t>
+              <a:t>2015-08-10</a:t>
             </a:fld>
             <a:endParaRPr lang="ko-KR" altLang="en-US"/>
           </a:p>
@@ -1335,7 +1335,7 @@
           <a:p>
             <a:fld id="{FB30EDBD-1C2D-4C1E-B459-B60219FAB484}" type="datetimeFigureOut">
               <a:rPr lang="ko-KR" altLang="en-US" smtClean="0"/>
-              <a:t>2015-05-29</a:t>
+              <a:t>2015-08-10</a:t>
             </a:fld>
             <a:endParaRPr lang="ko-KR" altLang="en-US"/>
           </a:p>
@@ -1752,7 +1752,7 @@
           <a:p>
             <a:fld id="{FB30EDBD-1C2D-4C1E-B459-B60219FAB484}" type="datetimeFigureOut">
               <a:rPr lang="ko-KR" altLang="en-US" smtClean="0"/>
-              <a:t>2015-05-29</a:t>
+              <a:t>2015-08-10</a:t>
             </a:fld>
             <a:endParaRPr lang="ko-KR" altLang="en-US"/>
           </a:p>
@@ -1865,7 +1865,7 @@
           <a:p>
             <a:fld id="{FB30EDBD-1C2D-4C1E-B459-B60219FAB484}" type="datetimeFigureOut">
               <a:rPr lang="ko-KR" altLang="en-US" smtClean="0"/>
-              <a:t>2015-05-29</a:t>
+              <a:t>2015-08-10</a:t>
             </a:fld>
             <a:endParaRPr lang="ko-KR" altLang="en-US"/>
           </a:p>
@@ -1955,7 +1955,7 @@
           <a:p>
             <a:fld id="{FB30EDBD-1C2D-4C1E-B459-B60219FAB484}" type="datetimeFigureOut">
               <a:rPr lang="ko-KR" altLang="en-US" smtClean="0"/>
-              <a:t>2015-05-29</a:t>
+              <a:t>2015-08-10</a:t>
             </a:fld>
             <a:endParaRPr lang="ko-KR" altLang="en-US"/>
           </a:p>
@@ -2227,7 +2227,7 @@
           <a:p>
             <a:fld id="{FB30EDBD-1C2D-4C1E-B459-B60219FAB484}" type="datetimeFigureOut">
               <a:rPr lang="ko-KR" altLang="en-US" smtClean="0"/>
-              <a:t>2015-05-29</a:t>
+              <a:t>2015-08-10</a:t>
             </a:fld>
             <a:endParaRPr lang="ko-KR" altLang="en-US"/>
           </a:p>
@@ -2475,7 +2475,7 @@
           <a:p>
             <a:fld id="{FB30EDBD-1C2D-4C1E-B459-B60219FAB484}" type="datetimeFigureOut">
               <a:rPr lang="ko-KR" altLang="en-US" smtClean="0"/>
-              <a:t>2015-05-29</a:t>
+              <a:t>2015-08-10</a:t>
             </a:fld>
             <a:endParaRPr lang="ko-KR" altLang="en-US"/>
           </a:p>
@@ -2683,7 +2683,7 @@
           <a:p>
             <a:fld id="{FB30EDBD-1C2D-4C1E-B459-B60219FAB484}" type="datetimeFigureOut">
               <a:rPr lang="ko-KR" altLang="en-US" smtClean="0"/>
-              <a:t>2015-05-29</a:t>
+              <a:t>2015-08-10</a:t>
             </a:fld>
             <a:endParaRPr lang="ko-KR" altLang="en-US"/>
           </a:p>
@@ -7743,11 +7743,7 @@
           <a:p>
             <a:r>
               <a:rPr lang="en-US" altLang="ko-KR" dirty="0" smtClean="0"/>
-              <a:t>Circuits for </a:t>
-            </a:r>
-            <a:r>
-              <a:rPr lang="en-US" altLang="ko-KR" dirty="0" smtClean="0"/>
-              <a:t>Appendix</a:t>
+              <a:t>Circuits for Appendix</a:t>
             </a:r>
             <a:endParaRPr lang="ko-KR" altLang="en-US" dirty="0"/>
           </a:p>
@@ -14950,6 +14946,330 @@
           </a:fontRef>
         </p:style>
       </p:cxnSp>
+      <p:pic>
+        <p:nvPicPr>
+          <p:cNvPr id="24" name="Picture 5"/>
+          <p:cNvPicPr>
+            <a:picLocks noChangeAspect="1" noChangeArrowheads="1"/>
+          </p:cNvPicPr>
+          <p:nvPr/>
+        </p:nvPicPr>
+        <p:blipFill>
+          <a:blip r:embed="rId4" cstate="print">
+            <a:extLst>
+              <a:ext uri="{BEBA8EAE-BF5A-486C-A8C5-ECC9F3942E4B}">
+                <a14:imgProps xmlns:a14="http://schemas.microsoft.com/office/drawing/2010/main">
+                  <a14:imgLayer r:embed="rId5">
+                    <a14:imgEffect>
+                      <a14:backgroundRemoval t="8696" b="81988" l="0" r="100000"/>
+                    </a14:imgEffect>
+                  </a14:imgLayer>
+                </a14:imgProps>
+              </a:ext>
+              <a:ext uri="{28A0092B-C50C-407E-A947-70E740481C1C}">
+                <a14:useLocalDpi xmlns:a14="http://schemas.microsoft.com/office/drawing/2010/main" val="0"/>
+              </a:ext>
+            </a:extLst>
+          </a:blip>
+          <a:srcRect/>
+          <a:stretch>
+            <a:fillRect/>
+          </a:stretch>
+        </p:blipFill>
+        <p:spPr bwMode="auto">
+          <a:xfrm>
+            <a:off x="2555776" y="2522375"/>
+            <a:ext cx="725690" cy="337677"/>
+          </a:xfrm>
+          <a:prstGeom prst="rect">
+            <a:avLst/>
+          </a:prstGeom>
+          <a:noFill/>
+          <a:ln>
+            <a:noFill/>
+          </a:ln>
+          <a:effectLst/>
+          <a:extLst>
+            <a:ext uri="{909E8E84-426E-40DD-AFC4-6F175D3DCCD1}">
+              <a14:hiddenFill xmlns:a14="http://schemas.microsoft.com/office/drawing/2010/main">
+                <a:solidFill>
+                  <a:schemeClr val="accent1"/>
+                </a:solidFill>
+              </a14:hiddenFill>
+            </a:ext>
+            <a:ext uri="{91240B29-F687-4F45-9708-019B960494DF}">
+              <a14:hiddenLine xmlns:a14="http://schemas.microsoft.com/office/drawing/2010/main" w="9525">
+                <a:solidFill>
+                  <a:schemeClr val="tx1"/>
+                </a:solidFill>
+                <a:miter lim="800000"/>
+                <a:headEnd/>
+                <a:tailEnd/>
+              </a14:hiddenLine>
+            </a:ext>
+            <a:ext uri="{AF507438-7753-43E0-B8FC-AC1667EBCBE1}">
+              <a14:hiddenEffects xmlns:a14="http://schemas.microsoft.com/office/drawing/2010/main">
+                <a:effectLst>
+                  <a:outerShdw dist="35921" dir="2700000" algn="ctr" rotWithShape="0">
+                    <a:schemeClr val="bg2"/>
+                  </a:outerShdw>
+                </a:effectLst>
+              </a14:hiddenEffects>
+            </a:ext>
+          </a:extLst>
+        </p:spPr>
+      </p:pic>
+      <p:sp>
+        <p:nvSpPr>
+          <p:cNvPr id="26" name="TextBox 25"/>
+          <p:cNvSpPr txBox="1"/>
+          <p:nvPr/>
+        </p:nvSpPr>
+        <p:spPr>
+          <a:xfrm>
+            <a:off x="2445032" y="2317696"/>
+            <a:ext cx="790297" cy="276999"/>
+          </a:xfrm>
+          <a:prstGeom prst="rect">
+            <a:avLst/>
+          </a:prstGeom>
+          <a:noFill/>
+        </p:spPr>
+        <p:txBody>
+          <a:bodyPr wrap="square" rtlCol="0">
+            <a:spAutoFit/>
+          </a:bodyPr>
+          <a:lstStyle/>
+          <a:p>
+            <a:pPr algn="ctr"/>
+            <a:r>
+              <a:rPr lang="en-US" altLang="ko-KR" sz="1200" b="1" dirty="0" smtClean="0"/>
+              <a:t>330</a:t>
+            </a:r>
+            <a:r>
+              <a:rPr lang="ko-KR" altLang="ko-KR" sz="1200" b="1" dirty="0"/>
+              <a:t>Ω</a:t>
+            </a:r>
+            <a:endParaRPr lang="ko-KR" altLang="en-US" sz="1200" b="1" dirty="0"/>
+          </a:p>
+        </p:txBody>
+      </p:sp>
+      <p:pic>
+        <p:nvPicPr>
+          <p:cNvPr id="27" name="Picture 5"/>
+          <p:cNvPicPr>
+            <a:picLocks noChangeAspect="1" noChangeArrowheads="1"/>
+          </p:cNvPicPr>
+          <p:nvPr/>
+        </p:nvPicPr>
+        <p:blipFill>
+          <a:blip r:embed="rId4" cstate="print">
+            <a:extLst>
+              <a:ext uri="{BEBA8EAE-BF5A-486C-A8C5-ECC9F3942E4B}">
+                <a14:imgProps xmlns:a14="http://schemas.microsoft.com/office/drawing/2010/main">
+                  <a14:imgLayer r:embed="rId5">
+                    <a14:imgEffect>
+                      <a14:backgroundRemoval t="8696" b="81988" l="0" r="100000"/>
+                    </a14:imgEffect>
+                  </a14:imgLayer>
+                </a14:imgProps>
+              </a:ext>
+              <a:ext uri="{28A0092B-C50C-407E-A947-70E740481C1C}">
+                <a14:useLocalDpi xmlns:a14="http://schemas.microsoft.com/office/drawing/2010/main" val="0"/>
+              </a:ext>
+            </a:extLst>
+          </a:blip>
+          <a:srcRect/>
+          <a:stretch>
+            <a:fillRect/>
+          </a:stretch>
+        </p:blipFill>
+        <p:spPr bwMode="auto">
+          <a:xfrm>
+            <a:off x="2599958" y="4156337"/>
+            <a:ext cx="725690" cy="337677"/>
+          </a:xfrm>
+          <a:prstGeom prst="rect">
+            <a:avLst/>
+          </a:prstGeom>
+          <a:noFill/>
+          <a:ln>
+            <a:noFill/>
+          </a:ln>
+          <a:effectLst/>
+          <a:extLst>
+            <a:ext uri="{909E8E84-426E-40DD-AFC4-6F175D3DCCD1}">
+              <a14:hiddenFill xmlns:a14="http://schemas.microsoft.com/office/drawing/2010/main">
+                <a:solidFill>
+                  <a:schemeClr val="accent1"/>
+                </a:solidFill>
+              </a14:hiddenFill>
+            </a:ext>
+            <a:ext uri="{91240B29-F687-4F45-9708-019B960494DF}">
+              <a14:hiddenLine xmlns:a14="http://schemas.microsoft.com/office/drawing/2010/main" w="9525">
+                <a:solidFill>
+                  <a:schemeClr val="tx1"/>
+                </a:solidFill>
+                <a:miter lim="800000"/>
+                <a:headEnd/>
+                <a:tailEnd/>
+              </a14:hiddenLine>
+            </a:ext>
+            <a:ext uri="{AF507438-7753-43E0-B8FC-AC1667EBCBE1}">
+              <a14:hiddenEffects xmlns:a14="http://schemas.microsoft.com/office/drawing/2010/main">
+                <a:effectLst>
+                  <a:outerShdw dist="35921" dir="2700000" algn="ctr" rotWithShape="0">
+                    <a:schemeClr val="bg2"/>
+                  </a:outerShdw>
+                </a:effectLst>
+              </a14:hiddenEffects>
+            </a:ext>
+          </a:extLst>
+        </p:spPr>
+      </p:pic>
+      <p:sp>
+        <p:nvSpPr>
+          <p:cNvPr id="30" name="TextBox 29"/>
+          <p:cNvSpPr txBox="1"/>
+          <p:nvPr/>
+        </p:nvSpPr>
+        <p:spPr>
+          <a:xfrm>
+            <a:off x="2489214" y="3951658"/>
+            <a:ext cx="790297" cy="276999"/>
+          </a:xfrm>
+          <a:prstGeom prst="rect">
+            <a:avLst/>
+          </a:prstGeom>
+          <a:noFill/>
+        </p:spPr>
+        <p:txBody>
+          <a:bodyPr wrap="square" rtlCol="0">
+            <a:spAutoFit/>
+          </a:bodyPr>
+          <a:lstStyle/>
+          <a:p>
+            <a:pPr algn="ctr"/>
+            <a:r>
+              <a:rPr lang="en-US" altLang="ko-KR" sz="1200" b="1" dirty="0" smtClean="0"/>
+              <a:t>330</a:t>
+            </a:r>
+            <a:r>
+              <a:rPr lang="ko-KR" altLang="ko-KR" sz="1200" b="1" dirty="0"/>
+              <a:t>Ω</a:t>
+            </a:r>
+            <a:endParaRPr lang="ko-KR" altLang="en-US" sz="1200" b="1" dirty="0"/>
+          </a:p>
+        </p:txBody>
+      </p:sp>
+      <p:pic>
+        <p:nvPicPr>
+          <p:cNvPr id="31" name="Picture 5"/>
+          <p:cNvPicPr>
+            <a:picLocks noChangeAspect="1" noChangeArrowheads="1"/>
+          </p:cNvPicPr>
+          <p:nvPr/>
+        </p:nvPicPr>
+        <p:blipFill>
+          <a:blip r:embed="rId4" cstate="print">
+            <a:extLst>
+              <a:ext uri="{BEBA8EAE-BF5A-486C-A8C5-ECC9F3942E4B}">
+                <a14:imgProps xmlns:a14="http://schemas.microsoft.com/office/drawing/2010/main">
+                  <a14:imgLayer r:embed="rId5">
+                    <a14:imgEffect>
+                      <a14:backgroundRemoval t="8696" b="81988" l="0" r="100000"/>
+                    </a14:imgEffect>
+                  </a14:imgLayer>
+                </a14:imgProps>
+              </a:ext>
+              <a:ext uri="{28A0092B-C50C-407E-A947-70E740481C1C}">
+                <a14:useLocalDpi xmlns:a14="http://schemas.microsoft.com/office/drawing/2010/main" val="0"/>
+              </a:ext>
+            </a:extLst>
+          </a:blip>
+          <a:srcRect/>
+          <a:stretch>
+            <a:fillRect/>
+          </a:stretch>
+        </p:blipFill>
+        <p:spPr bwMode="auto">
+          <a:xfrm>
+            <a:off x="2597432" y="4941316"/>
+            <a:ext cx="725690" cy="337677"/>
+          </a:xfrm>
+          <a:prstGeom prst="rect">
+            <a:avLst/>
+          </a:prstGeom>
+          <a:noFill/>
+          <a:ln>
+            <a:noFill/>
+          </a:ln>
+          <a:effectLst/>
+          <a:extLst>
+            <a:ext uri="{909E8E84-426E-40DD-AFC4-6F175D3DCCD1}">
+              <a14:hiddenFill xmlns:a14="http://schemas.microsoft.com/office/drawing/2010/main">
+                <a:solidFill>
+                  <a:schemeClr val="accent1"/>
+                </a:solidFill>
+              </a14:hiddenFill>
+            </a:ext>
+            <a:ext uri="{91240B29-F687-4F45-9708-019B960494DF}">
+              <a14:hiddenLine xmlns:a14="http://schemas.microsoft.com/office/drawing/2010/main" w="9525">
+                <a:solidFill>
+                  <a:schemeClr val="tx1"/>
+                </a:solidFill>
+                <a:miter lim="800000"/>
+                <a:headEnd/>
+                <a:tailEnd/>
+              </a14:hiddenLine>
+            </a:ext>
+            <a:ext uri="{AF507438-7753-43E0-B8FC-AC1667EBCBE1}">
+              <a14:hiddenEffects xmlns:a14="http://schemas.microsoft.com/office/drawing/2010/main">
+                <a:effectLst>
+                  <a:outerShdw dist="35921" dir="2700000" algn="ctr" rotWithShape="0">
+                    <a:schemeClr val="bg2"/>
+                  </a:outerShdw>
+                </a:effectLst>
+              </a14:hiddenEffects>
+            </a:ext>
+          </a:extLst>
+        </p:spPr>
+      </p:pic>
+      <p:sp>
+        <p:nvSpPr>
+          <p:cNvPr id="32" name="TextBox 31"/>
+          <p:cNvSpPr txBox="1"/>
+          <p:nvPr/>
+        </p:nvSpPr>
+        <p:spPr>
+          <a:xfrm>
+            <a:off x="2486688" y="4736637"/>
+            <a:ext cx="790297" cy="276999"/>
+          </a:xfrm>
+          <a:prstGeom prst="rect">
+            <a:avLst/>
+          </a:prstGeom>
+          <a:noFill/>
+        </p:spPr>
+        <p:txBody>
+          <a:bodyPr wrap="square" rtlCol="0">
+            <a:spAutoFit/>
+          </a:bodyPr>
+          <a:lstStyle/>
+          <a:p>
+            <a:pPr algn="ctr"/>
+            <a:r>
+              <a:rPr lang="en-US" altLang="ko-KR" sz="1200" b="1" dirty="0" smtClean="0"/>
+              <a:t>330</a:t>
+            </a:r>
+            <a:r>
+              <a:rPr lang="ko-KR" altLang="ko-KR" sz="1200" b="1" dirty="0"/>
+              <a:t>Ω</a:t>
+            </a:r>
+            <a:endParaRPr lang="ko-KR" altLang="en-US" sz="1200" b="1" dirty="0"/>
+          </a:p>
+        </p:txBody>
+      </p:sp>
     </p:spTree>
     <p:extLst>
       <p:ext uri="{BB962C8B-B14F-4D97-AF65-F5344CB8AC3E}">

</xml_diff>